<commit_message>
before winter school 2022
</commit_message>
<xml_diff>
--- a/1_PhDDefence/Figures/PowerFlow.pptx
+++ b/1_PhDDefence/Figures/PowerFlow.pptx
@@ -104,6 +104,11 @@
       </a:defRPr>
     </a:lvl9pPr>
   </p:defaultTextStyle>
+  <p:extLst>
+    <p:ext uri="{EFAFB233-063F-42B5-8137-9DF3F51BA10A}">
+      <p15:sldGuideLst xmlns:p15="http://schemas.microsoft.com/office/powerpoint/2012/main"/>
+    </p:ext>
+  </p:extLst>
 </p:presentation>
 </file>
 
@@ -256,7 +261,7 @@
           <a:p>
             <a:fld id="{2EFBAEA6-F9A6-4C87-9A18-20544B44E711}" type="datetimeFigureOut">
               <a:rPr lang="en-GB" smtClean="0"/>
-              <a:t>27/10/2020</a:t>
+              <a:t>26/02/2022</a:t>
             </a:fld>
             <a:endParaRPr lang="en-GB"/>
           </a:p>
@@ -456,7 +461,7 @@
           <a:p>
             <a:fld id="{2EFBAEA6-F9A6-4C87-9A18-20544B44E711}" type="datetimeFigureOut">
               <a:rPr lang="en-GB" smtClean="0"/>
-              <a:t>27/10/2020</a:t>
+              <a:t>26/02/2022</a:t>
             </a:fld>
             <a:endParaRPr lang="en-GB"/>
           </a:p>
@@ -666,7 +671,7 @@
           <a:p>
             <a:fld id="{2EFBAEA6-F9A6-4C87-9A18-20544B44E711}" type="datetimeFigureOut">
               <a:rPr lang="en-GB" smtClean="0"/>
-              <a:t>27/10/2020</a:t>
+              <a:t>26/02/2022</a:t>
             </a:fld>
             <a:endParaRPr lang="en-GB"/>
           </a:p>
@@ -866,7 +871,7 @@
           <a:p>
             <a:fld id="{2EFBAEA6-F9A6-4C87-9A18-20544B44E711}" type="datetimeFigureOut">
               <a:rPr lang="en-GB" smtClean="0"/>
-              <a:t>27/10/2020</a:t>
+              <a:t>26/02/2022</a:t>
             </a:fld>
             <a:endParaRPr lang="en-GB"/>
           </a:p>
@@ -1142,7 +1147,7 @@
           <a:p>
             <a:fld id="{2EFBAEA6-F9A6-4C87-9A18-20544B44E711}" type="datetimeFigureOut">
               <a:rPr lang="en-GB" smtClean="0"/>
-              <a:t>27/10/2020</a:t>
+              <a:t>26/02/2022</a:t>
             </a:fld>
             <a:endParaRPr lang="en-GB"/>
           </a:p>
@@ -1410,7 +1415,7 @@
           <a:p>
             <a:fld id="{2EFBAEA6-F9A6-4C87-9A18-20544B44E711}" type="datetimeFigureOut">
               <a:rPr lang="en-GB" smtClean="0"/>
-              <a:t>27/10/2020</a:t>
+              <a:t>26/02/2022</a:t>
             </a:fld>
             <a:endParaRPr lang="en-GB"/>
           </a:p>
@@ -1825,7 +1830,7 @@
           <a:p>
             <a:fld id="{2EFBAEA6-F9A6-4C87-9A18-20544B44E711}" type="datetimeFigureOut">
               <a:rPr lang="en-GB" smtClean="0"/>
-              <a:t>27/10/2020</a:t>
+              <a:t>26/02/2022</a:t>
             </a:fld>
             <a:endParaRPr lang="en-GB"/>
           </a:p>
@@ -1967,7 +1972,7 @@
           <a:p>
             <a:fld id="{2EFBAEA6-F9A6-4C87-9A18-20544B44E711}" type="datetimeFigureOut">
               <a:rPr lang="en-GB" smtClean="0"/>
-              <a:t>27/10/2020</a:t>
+              <a:t>26/02/2022</a:t>
             </a:fld>
             <a:endParaRPr lang="en-GB"/>
           </a:p>
@@ -2080,7 +2085,7 @@
           <a:p>
             <a:fld id="{2EFBAEA6-F9A6-4C87-9A18-20544B44E711}" type="datetimeFigureOut">
               <a:rPr lang="en-GB" smtClean="0"/>
-              <a:t>27/10/2020</a:t>
+              <a:t>26/02/2022</a:t>
             </a:fld>
             <a:endParaRPr lang="en-GB"/>
           </a:p>
@@ -2393,7 +2398,7 @@
           <a:p>
             <a:fld id="{2EFBAEA6-F9A6-4C87-9A18-20544B44E711}" type="datetimeFigureOut">
               <a:rPr lang="en-GB" smtClean="0"/>
-              <a:t>27/10/2020</a:t>
+              <a:t>26/02/2022</a:t>
             </a:fld>
             <a:endParaRPr lang="en-GB"/>
           </a:p>
@@ -2682,7 +2687,7 @@
           <a:p>
             <a:fld id="{2EFBAEA6-F9A6-4C87-9A18-20544B44E711}" type="datetimeFigureOut">
               <a:rPr lang="en-GB" smtClean="0"/>
-              <a:t>27/10/2020</a:t>
+              <a:t>26/02/2022</a:t>
             </a:fld>
             <a:endParaRPr lang="en-GB"/>
           </a:p>
@@ -2925,7 +2930,7 @@
           <a:p>
             <a:fld id="{2EFBAEA6-F9A6-4C87-9A18-20544B44E711}" type="datetimeFigureOut">
               <a:rPr lang="en-GB" smtClean="0"/>
-              <a:t>27/10/2020</a:t>
+              <a:t>26/02/2022</a:t>
             </a:fld>
             <a:endParaRPr lang="en-GB"/>
           </a:p>
@@ -3488,7 +3493,7 @@
             <p:spPr>
               <a:xfrm>
                 <a:off x="3526972" y="1912586"/>
-                <a:ext cx="5484322" cy="1441933"/>
+                <a:ext cx="5484322" cy="1472198"/>
               </a:xfrm>
               <a:prstGeom prst="rect">
                 <a:avLst/>
@@ -3510,6 +3515,7 @@
                 <a:endParaRPr lang="en-GB" dirty="0"/>
               </a:p>
               <a:p>
+                <a:pPr/>
                 <a14:m>
                   <m:oMathPara xmlns:m="http://schemas.openxmlformats.org/officeDocument/2006/math">
                     <m:oMathParaPr>
@@ -3589,16 +3595,66 @@
                             <a:rPr lang="nb-NO" b="0" i="1" smtClean="0">
                               <a:latin typeface="Cambria Math" panose="02040503050406030204" pitchFamily="18" charset="0"/>
                             </a:rPr>
-                            <m:t>1</m:t>
+                            <m:t>𝑅</m:t>
                           </m:r>
                         </m:num>
                         <m:den>
+                          <m:sSup>
+                            <m:sSupPr>
+                              <m:ctrlPr>
+                                <a:rPr lang="nb-NO" i="1">
+                                  <a:latin typeface="Cambria Math" panose="02040503050406030204" pitchFamily="18" charset="0"/>
+                                </a:rPr>
+                              </m:ctrlPr>
+                            </m:sSupPr>
+                            <m:e>
+                              <m:r>
+                                <a:rPr lang="nb-NO" i="1">
+                                  <a:latin typeface="Cambria Math" panose="02040503050406030204" pitchFamily="18" charset="0"/>
+                                </a:rPr>
+                                <m:t>𝑅</m:t>
+                              </m:r>
+                            </m:e>
+                            <m:sup>
+                              <m:r>
+                                <a:rPr lang="nb-NO" i="1">
+                                  <a:latin typeface="Cambria Math" panose="02040503050406030204" pitchFamily="18" charset="0"/>
+                                </a:rPr>
+                                <m:t>2</m:t>
+                              </m:r>
+                            </m:sup>
+                          </m:sSup>
                           <m:r>
-                            <a:rPr lang="nb-NO" b="0" i="1" smtClean="0">
+                            <a:rPr lang="nb-NO" i="1">
                               <a:latin typeface="Cambria Math" panose="02040503050406030204" pitchFamily="18" charset="0"/>
                             </a:rPr>
-                            <m:t>𝑅</m:t>
+                            <m:t>+</m:t>
                           </m:r>
+                          <m:sSup>
+                            <m:sSupPr>
+                              <m:ctrlPr>
+                                <a:rPr lang="nb-NO" i="1">
+                                  <a:latin typeface="Cambria Math" panose="02040503050406030204" pitchFamily="18" charset="0"/>
+                                </a:rPr>
+                              </m:ctrlPr>
+                            </m:sSupPr>
+                            <m:e>
+                              <m:r>
+                                <a:rPr lang="nb-NO" i="1">
+                                  <a:latin typeface="Cambria Math" panose="02040503050406030204" pitchFamily="18" charset="0"/>
+                                </a:rPr>
+                                <m:t>𝑋</m:t>
+                              </m:r>
+                            </m:e>
+                            <m:sup>
+                              <m:r>
+                                <a:rPr lang="nb-NO" i="1">
+                                  <a:latin typeface="Cambria Math" panose="02040503050406030204" pitchFamily="18" charset="0"/>
+                                </a:rPr>
+                                <m:t>2</m:t>
+                              </m:r>
+                            </m:sup>
+                          </m:sSup>
                         </m:den>
                       </m:f>
                       <m:r>
@@ -3632,16 +3688,72 @@
                             <a:rPr lang="nb-NO" b="0" i="1" smtClean="0">
                               <a:latin typeface="Cambria Math" panose="02040503050406030204" pitchFamily="18" charset="0"/>
                             </a:rPr>
-                            <m:t>1</m:t>
+                            <m:t>−</m:t>
                           </m:r>
-                        </m:num>
-                        <m:den>
                           <m:r>
                             <a:rPr lang="nb-NO" b="0" i="1" smtClean="0">
                               <a:latin typeface="Cambria Math" panose="02040503050406030204" pitchFamily="18" charset="0"/>
                             </a:rPr>
                             <m:t>𝑋</m:t>
                           </m:r>
+                        </m:num>
+                        <m:den>
+                          <m:sSup>
+                            <m:sSupPr>
+                              <m:ctrlPr>
+                                <a:rPr lang="nb-NO" b="0" i="1" smtClean="0">
+                                  <a:latin typeface="Cambria Math" panose="02040503050406030204" pitchFamily="18" charset="0"/>
+                                </a:rPr>
+                              </m:ctrlPr>
+                            </m:sSupPr>
+                            <m:e>
+                              <m:r>
+                                <a:rPr lang="nb-NO" b="0" i="1" smtClean="0">
+                                  <a:latin typeface="Cambria Math" panose="02040503050406030204" pitchFamily="18" charset="0"/>
+                                </a:rPr>
+                                <m:t>𝑅</m:t>
+                              </m:r>
+                            </m:e>
+                            <m:sup>
+                              <m:r>
+                                <a:rPr lang="nb-NO" b="0" i="1" smtClean="0">
+                                  <a:latin typeface="Cambria Math" panose="02040503050406030204" pitchFamily="18" charset="0"/>
+                                </a:rPr>
+                                <m:t>2</m:t>
+                              </m:r>
+                            </m:sup>
+                          </m:sSup>
+                          <m:r>
+                            <a:rPr lang="nb-NO" b="0" i="1" smtClean="0">
+                              <a:latin typeface="Cambria Math" panose="02040503050406030204" pitchFamily="18" charset="0"/>
+                            </a:rPr>
+                            <m:t>+</m:t>
+                          </m:r>
+                          <m:sSup>
+                            <m:sSupPr>
+                              <m:ctrlPr>
+                                <a:rPr lang="nb-NO" b="0" i="1" smtClean="0">
+                                  <a:latin typeface="Cambria Math" panose="02040503050406030204" pitchFamily="18" charset="0"/>
+                                </a:rPr>
+                              </m:ctrlPr>
+                            </m:sSupPr>
+                            <m:e>
+                              <m:r>
+                                <a:rPr lang="nb-NO" b="0" i="1" smtClean="0">
+                                  <a:latin typeface="Cambria Math" panose="02040503050406030204" pitchFamily="18" charset="0"/>
+                                </a:rPr>
+                                <m:t>𝑋</m:t>
+                              </m:r>
+                            </m:e>
+                            <m:sup>
+                              <m:r>
+                                <a:rPr lang="nb-NO" b="0" i="1" smtClean="0">
+                                  <a:latin typeface="Cambria Math" panose="02040503050406030204" pitchFamily="18" charset="0"/>
+                                </a:rPr>
+                                <m:t>2</m:t>
+                              </m:r>
+                            </m:sup>
+                          </m:sSup>
                         </m:den>
                       </m:f>
                     </m:oMath>
@@ -3676,7 +3788,7 @@
             <p:spPr>
               <a:xfrm>
                 <a:off x="3526972" y="1912586"/>
-                <a:ext cx="5484322" cy="1441933"/>
+                <a:ext cx="5484322" cy="1472198"/>
               </a:xfrm>
               <a:prstGeom prst="rect">
                 <a:avLst/>
@@ -3684,7 +3796,7 @@
               <a:blipFill>
                 <a:blip r:embed="rId2"/>
                 <a:stretch>
-                  <a:fillRect l="-1001" t="-2542" r="-334" b="-5932"/>
+                  <a:fillRect l="-1001" t="-2490" r="-334" b="-4149"/>
                 </a:stretch>
               </a:blipFill>
             </p:spPr>
@@ -3703,8 +3815,8 @@
           </p:sp>
         </mc:Fallback>
       </mc:AlternateContent>
-      <mc:AlternateContent xmlns:mc="http://schemas.openxmlformats.org/markup-compatibility/2006">
-        <mc:Choice xmlns:a14="http://schemas.microsoft.com/office/drawing/2010/main" Requires="a14">
+      <mc:AlternateContent xmlns:mc="http://schemas.openxmlformats.org/markup-compatibility/2006" xmlns:a14="http://schemas.microsoft.com/office/drawing/2010/main">
+        <mc:Choice Requires="a14">
           <p:sp>
             <p:nvSpPr>
               <p:cNvPr id="9" name="TextBox 8">
@@ -3747,6 +3859,7 @@
                 </a:r>
               </a:p>
               <a:p>
+                <a:pPr/>
                 <a14:m>
                   <m:oMathPara xmlns:m="http://schemas.openxmlformats.org/officeDocument/2006/math">
                     <m:oMathParaPr>
@@ -3918,6 +4031,7 @@
                 </a:endParaRPr>
               </a:p>
               <a:p>
+                <a:pPr/>
                 <a14:m>
                   <m:oMathPara xmlns:m="http://schemas.openxmlformats.org/officeDocument/2006/math">
                     <m:oMathParaPr>
@@ -4046,7 +4160,7 @@
             </p:txBody>
           </p:sp>
         </mc:Choice>
-        <mc:Fallback>
+        <mc:Fallback xmlns="">
           <p:sp>
             <p:nvSpPr>
               <p:cNvPr id="9" name="TextBox 8">
@@ -4091,8 +4205,8 @@
           </p:sp>
         </mc:Fallback>
       </mc:AlternateContent>
-      <mc:AlternateContent xmlns:mc="http://schemas.openxmlformats.org/markup-compatibility/2006">
-        <mc:Choice xmlns:a14="http://schemas.microsoft.com/office/drawing/2010/main" Requires="a14">
+      <mc:AlternateContent xmlns:mc="http://schemas.openxmlformats.org/markup-compatibility/2006" xmlns:a14="http://schemas.microsoft.com/office/drawing/2010/main">
+        <mc:Choice Requires="a14">
           <p:sp>
             <p:nvSpPr>
               <p:cNvPr id="10" name="TextBox 9">
@@ -4135,6 +4249,7 @@
                 </a:r>
               </a:p>
               <a:p>
+                <a:pPr/>
                 <a14:m>
                   <m:oMathPara xmlns:m="http://schemas.openxmlformats.org/officeDocument/2006/math">
                     <m:oMathParaPr>
@@ -4306,6 +4421,7 @@
                 </a:endParaRPr>
               </a:p>
               <a:p>
+                <a:pPr/>
                 <a14:m>
                   <m:oMathPara xmlns:m="http://schemas.openxmlformats.org/officeDocument/2006/math">
                     <m:oMathParaPr>
@@ -4434,7 +4550,7 @@
             </p:txBody>
           </p:sp>
         </mc:Choice>
-        <mc:Fallback>
+        <mc:Fallback xmlns="">
           <p:sp>
             <p:nvSpPr>
               <p:cNvPr id="10" name="TextBox 9">

</xml_diff>